<commit_message>
Tabulated the Accuracy Results + Removed Unneccesy Files
</commit_message>
<xml_diff>
--- a/ICS5118 _FER _JeromeAgius_0353803L.pptx
+++ b/ICS5118 _FER _JeromeAgius_0353803L.pptx
@@ -290,7 +290,7 @@
             <a:fld id="{11A6662E-FAF4-44BC-88B5-85A7CBFB6D30}" type="datetime1">
               <a:rPr lang="en-US" smtClean="0"/>
               <a:pPr/>
-              <a:t>4/7/2025</a:t>
+              <a:t>4/8/2025</a:t>
             </a:fld>
             <a:endParaRPr lang="en-US" dirty="0"/>
           </a:p>
@@ -517,7 +517,7 @@
           <a:p>
             <a:fld id="{4C559632-1575-4E14-B53B-3DC3D5ED3947}" type="datetime1">
               <a:rPr lang="en-US" smtClean="0"/>
-              <a:t>4/7/2025</a:t>
+              <a:t>4/8/2025</a:t>
             </a:fld>
             <a:endParaRPr lang="en-US"/>
           </a:p>
@@ -725,7 +725,7 @@
           <a:p>
             <a:fld id="{CC4A6868-2568-4CC9-B302-F37117B01A6E}" type="datetime1">
               <a:rPr lang="en-US" smtClean="0"/>
-              <a:t>4/7/2025</a:t>
+              <a:t>4/8/2025</a:t>
             </a:fld>
             <a:endParaRPr lang="en-US"/>
           </a:p>
@@ -929,7 +929,7 @@
           <a:p>
             <a:fld id="{0055F08A-1E71-4B2B-BB49-E743F2903911}" type="datetime1">
               <a:rPr lang="en-US" smtClean="0"/>
-              <a:t>4/7/2025</a:t>
+              <a:t>4/8/2025</a:t>
             </a:fld>
             <a:endParaRPr lang="en-US" dirty="0"/>
           </a:p>
@@ -1203,7 +1203,7 @@
           <a:p>
             <a:fld id="{15417D9E-721A-44BB-8863-9873FE64DA75}" type="datetime1">
               <a:rPr lang="en-US" smtClean="0"/>
-              <a:t>4/7/2025</a:t>
+              <a:t>4/8/2025</a:t>
             </a:fld>
             <a:endParaRPr lang="en-US"/>
           </a:p>
@@ -1476,7 +1476,7 @@
           <a:p>
             <a:fld id="{5F31DA2F-80B8-49CF-99FB-5ABCA53A607A}" type="datetime1">
               <a:rPr lang="en-US" smtClean="0"/>
-              <a:t>4/7/2025</a:t>
+              <a:t>4/8/2025</a:t>
             </a:fld>
             <a:endParaRPr lang="en-US"/>
           </a:p>
@@ -1891,7 +1891,7 @@
           <a:p>
             <a:fld id="{28852172-E6C9-4B6C-929A-A9DE3837BBF1}" type="datetime1">
               <a:rPr lang="en-US" smtClean="0"/>
-              <a:t>4/7/2025</a:t>
+              <a:t>4/8/2025</a:t>
             </a:fld>
             <a:endParaRPr lang="en-US"/>
           </a:p>
@@ -2043,7 +2043,7 @@
           <a:p>
             <a:fld id="{3AB41CFF-90C9-47B3-9DA1-F2BF8D839F7E}" type="datetime1">
               <a:rPr lang="en-US" smtClean="0"/>
-              <a:t>4/7/2025</a:t>
+              <a:t>4/8/2025</a:t>
             </a:fld>
             <a:endParaRPr lang="en-US"/>
           </a:p>
@@ -2156,7 +2156,7 @@
           <a:p>
             <a:fld id="{F06048FA-06AB-4884-A69B-986B96E68A24}" type="datetime1">
               <a:rPr lang="en-US" smtClean="0"/>
-              <a:t>4/7/2025</a:t>
+              <a:t>4/8/2025</a:t>
             </a:fld>
             <a:endParaRPr lang="en-US"/>
           </a:p>
@@ -2467,7 +2467,7 @@
           <a:p>
             <a:fld id="{50DB7ABA-0172-4F9C-889D-567164F66BCD}" type="datetime1">
               <a:rPr lang="en-US" smtClean="0"/>
-              <a:t>4/7/2025</a:t>
+              <a:t>4/8/2025</a:t>
             </a:fld>
             <a:endParaRPr lang="en-US"/>
           </a:p>
@@ -2758,7 +2758,7 @@
           <a:p>
             <a:fld id="{78AC6A5B-8AE7-4A41-B5A7-9ADC6686DC18}" type="datetime1">
               <a:rPr lang="en-US" smtClean="0"/>
-              <a:t>4/7/2025</a:t>
+              <a:t>4/8/2025</a:t>
             </a:fld>
             <a:endParaRPr lang="en-US"/>
           </a:p>
@@ -3067,7 +3067,7 @@
             <a:fld id="{57E0CF6C-748E-4B7A-BC8B-3011EF78ED13}" type="datetime1">
               <a:rPr lang="en-US" smtClean="0"/>
               <a:pPr/>
-              <a:t>4/7/2025</a:t>
+              <a:t>4/8/2025</a:t>
             </a:fld>
             <a:endParaRPr lang="en-US" dirty="0"/>
           </a:p>
@@ -9373,111 +9373,6 @@
   <p:clrMapOvr>
     <a:masterClrMapping/>
   </p:clrMapOvr>
-  <p:timing>
-    <p:tnLst>
-      <p:par>
-        <p:cTn id="1" dur="indefinite" restart="never" nodeType="tmRoot">
-          <p:childTnLst>
-            <p:seq concurrent="1" nextAc="seek">
-              <p:cTn id="2" dur="indefinite" nodeType="mainSeq">
-                <p:childTnLst>
-                  <p:par>
-                    <p:cTn id="3" fill="hold">
-                      <p:stCondLst>
-                        <p:cond delay="indefinite"/>
-                        <p:cond evt="onBegin" delay="0">
-                          <p:tn val="2"/>
-                        </p:cond>
-                      </p:stCondLst>
-                      <p:childTnLst>
-                        <p:par>
-                          <p:cTn id="4" fill="hold">
-                            <p:stCondLst>
-                              <p:cond delay="0"/>
-                            </p:stCondLst>
-                            <p:childTnLst>
-                              <p:par>
-                                <p:cTn id="5" presetID="1" presetClass="exit" presetSubtype="0" fill="hold" nodeType="withEffect">
-                                  <p:stCondLst>
-                                    <p:cond delay="0"/>
-                                  </p:stCondLst>
-                                  <p:childTnLst>
-                                    <p:set>
-                                      <p:cBhvr>
-                                        <p:cTn id="6" dur="1" fill="hold">
-                                          <p:stCondLst>
-                                            <p:cond delay="0"/>
-                                          </p:stCondLst>
-                                        </p:cTn>
-                                        <p:tgtEl>
-                                          <p:spTgt spid="12"/>
-                                        </p:tgtEl>
-                                        <p:attrNameLst>
-                                          <p:attrName>style.visibility</p:attrName>
-                                        </p:attrNameLst>
-                                      </p:cBhvr>
-                                      <p:to>
-                                        <p:strVal val="hidden"/>
-                                      </p:to>
-                                    </p:set>
-                                  </p:childTnLst>
-                                </p:cTn>
-                              </p:par>
-                              <p:par>
-                                <p:cTn id="7" presetID="1" presetClass="exit" presetSubtype="0" fill="hold" nodeType="withEffect">
-                                  <p:stCondLst>
-                                    <p:cond delay="0"/>
-                                  </p:stCondLst>
-                                  <p:childTnLst>
-                                    <p:set>
-                                      <p:cBhvr>
-                                        <p:cTn id="8" dur="1" fill="hold">
-                                          <p:stCondLst>
-                                            <p:cond delay="0"/>
-                                          </p:stCondLst>
-                                        </p:cTn>
-                                        <p:tgtEl>
-                                          <p:spTgt spid="11"/>
-                                        </p:tgtEl>
-                                        <p:attrNameLst>
-                                          <p:attrName>style.visibility</p:attrName>
-                                        </p:attrNameLst>
-                                      </p:cBhvr>
-                                      <p:to>
-                                        <p:strVal val="hidden"/>
-                                      </p:to>
-                                    </p:set>
-                                  </p:childTnLst>
-                                </p:cTn>
-                              </p:par>
-                            </p:childTnLst>
-                          </p:cTn>
-                        </p:par>
-                      </p:childTnLst>
-                    </p:cTn>
-                  </p:par>
-                </p:childTnLst>
-              </p:cTn>
-              <p:prevCondLst>
-                <p:cond evt="onPrev" delay="0">
-                  <p:tgtEl>
-                    <p:sldTgt/>
-                  </p:tgtEl>
-                </p:cond>
-              </p:prevCondLst>
-              <p:nextCondLst>
-                <p:cond evt="onNext" delay="0">
-                  <p:tgtEl>
-                    <p:sldTgt/>
-                  </p:tgtEl>
-                </p:cond>
-              </p:nextCondLst>
-            </p:seq>
-          </p:childTnLst>
-        </p:cTn>
-      </p:par>
-    </p:tnLst>
-  </p:timing>
 </p:sld>
 </file>
 
@@ -10011,81 +9906,6 @@
   <p:clrMapOvr>
     <a:masterClrMapping/>
   </p:clrMapOvr>
-  <p:timing>
-    <p:tnLst>
-      <p:par>
-        <p:cTn id="1" dur="indefinite" restart="never" nodeType="tmRoot">
-          <p:childTnLst>
-            <p:seq concurrent="1" nextAc="seek">
-              <p:cTn id="2" dur="indefinite" nodeType="mainSeq">
-                <p:childTnLst>
-                  <p:par>
-                    <p:cTn id="3" fill="hold">
-                      <p:stCondLst>
-                        <p:cond delay="indefinite"/>
-                      </p:stCondLst>
-                      <p:childTnLst>
-                        <p:par>
-                          <p:cTn id="4" fill="hold">
-                            <p:stCondLst>
-                              <p:cond delay="0"/>
-                            </p:stCondLst>
-                            <p:childTnLst>
-                              <p:par>
-                                <p:cTn id="5" presetID="1" presetClass="entr" presetSubtype="0" fill="hold" nodeType="clickEffect">
-                                  <p:stCondLst>
-                                    <p:cond delay="0"/>
-                                  </p:stCondLst>
-                                  <p:childTnLst>
-                                    <p:set>
-                                      <p:cBhvr>
-                                        <p:cTn id="6" dur="1" fill="hold">
-                                          <p:stCondLst>
-                                            <p:cond delay="0"/>
-                                          </p:stCondLst>
-                                        </p:cTn>
-                                        <p:tgtEl>
-                                          <p:spTgt spid="14"/>
-                                        </p:tgtEl>
-                                        <p:attrNameLst>
-                                          <p:attrName>style.visibility</p:attrName>
-                                        </p:attrNameLst>
-                                      </p:cBhvr>
-                                      <p:to>
-                                        <p:strVal val="visible"/>
-                                      </p:to>
-                                    </p:set>
-                                  </p:childTnLst>
-                                </p:cTn>
-                              </p:par>
-                            </p:childTnLst>
-                          </p:cTn>
-                        </p:par>
-                      </p:childTnLst>
-                    </p:cTn>
-                  </p:par>
-                </p:childTnLst>
-              </p:cTn>
-              <p:prevCondLst>
-                <p:cond evt="onPrev" delay="0">
-                  <p:tgtEl>
-                    <p:sldTgt/>
-                  </p:tgtEl>
-                </p:cond>
-              </p:prevCondLst>
-              <p:nextCondLst>
-                <p:cond evt="onNext" delay="0">
-                  <p:tgtEl>
-                    <p:sldTgt/>
-                  </p:tgtEl>
-                </p:cond>
-              </p:nextCondLst>
-            </p:seq>
-          </p:childTnLst>
-        </p:cTn>
-      </p:par>
-    </p:tnLst>
-  </p:timing>
 </p:sld>
 </file>
 

</xml_diff>